<commit_message>
tambah soal lat 2
</commit_message>
<xml_diff>
--- a/dunia ilkom/PPT/PART 43 WHILE DO.pptx
+++ b/dunia ilkom/PPT/PART 43 WHILE DO.pptx
@@ -264,7 +264,7 @@
           <a:p>
             <a:fld id="{48A87A34-81AB-432B-8DAE-1953F412C126}" type="datetimeFigureOut">
               <a:rPr lang="en-US" dirty="0"/>
-              <a:t>4/21/2021</a:t>
+              <a:t>4/24/2021</a:t>
             </a:fld>
             <a:endParaRPr lang="en-US" dirty="0"/>
           </a:p>
@@ -470,7 +470,7 @@
           <a:p>
             <a:fld id="{48A87A34-81AB-432B-8DAE-1953F412C126}" type="datetimeFigureOut">
               <a:rPr lang="en-US" dirty="0"/>
-              <a:t>4/21/2021</a:t>
+              <a:t>4/24/2021</a:t>
             </a:fld>
             <a:endParaRPr lang="en-US" dirty="0"/>
           </a:p>
@@ -680,7 +680,7 @@
           <a:p>
             <a:fld id="{48A87A34-81AB-432B-8DAE-1953F412C126}" type="datetimeFigureOut">
               <a:rPr lang="en-US" dirty="0"/>
-              <a:t>4/21/2021</a:t>
+              <a:t>4/24/2021</a:t>
             </a:fld>
             <a:endParaRPr lang="en-US" dirty="0"/>
           </a:p>
@@ -876,7 +876,7 @@
           <a:p>
             <a:fld id="{48A87A34-81AB-432B-8DAE-1953F412C126}" type="datetimeFigureOut">
               <a:rPr lang="en-US" dirty="0"/>
-              <a:t>4/21/2021</a:t>
+              <a:t>4/24/2021</a:t>
             </a:fld>
             <a:endParaRPr lang="en-US" dirty="0"/>
           </a:p>
@@ -1150,7 +1150,7 @@
           <a:p>
             <a:fld id="{48A87A34-81AB-432B-8DAE-1953F412C126}" type="datetimeFigureOut">
               <a:rPr lang="en-US" dirty="0"/>
-              <a:t>4/21/2021</a:t>
+              <a:t>4/24/2021</a:t>
             </a:fld>
             <a:endParaRPr lang="en-US" dirty="0"/>
           </a:p>
@@ -1413,7 +1413,7 @@
           <a:p>
             <a:fld id="{48A87A34-81AB-432B-8DAE-1953F412C126}" type="datetimeFigureOut">
               <a:rPr lang="en-US" dirty="0"/>
-              <a:t>4/21/2021</a:t>
+              <a:t>4/24/2021</a:t>
             </a:fld>
             <a:endParaRPr lang="en-US" dirty="0"/>
           </a:p>
@@ -1824,7 +1824,7 @@
           <a:p>
             <a:fld id="{48A87A34-81AB-432B-8DAE-1953F412C126}" type="datetimeFigureOut">
               <a:rPr lang="en-US" dirty="0"/>
-              <a:t>4/21/2021</a:t>
+              <a:t>4/24/2021</a:t>
             </a:fld>
             <a:endParaRPr lang="en-US" dirty="0"/>
           </a:p>
@@ -1968,7 +1968,7 @@
           <a:p>
             <a:fld id="{48A87A34-81AB-432B-8DAE-1953F412C126}" type="datetimeFigureOut">
               <a:rPr lang="en-US" dirty="0"/>
-              <a:t>4/21/2021</a:t>
+              <a:t>4/24/2021</a:t>
             </a:fld>
             <a:endParaRPr lang="en-US" dirty="0"/>
           </a:p>
@@ -2089,7 +2089,7 @@
           <a:p>
             <a:fld id="{48A87A34-81AB-432B-8DAE-1953F412C126}" type="datetimeFigureOut">
               <a:rPr lang="en-US" dirty="0"/>
-              <a:t>4/21/2021</a:t>
+              <a:t>4/24/2021</a:t>
             </a:fld>
             <a:endParaRPr lang="en-US" dirty="0"/>
           </a:p>
@@ -2335,7 +2335,7 @@
           <a:p>
             <a:fld id="{48A87A34-81AB-432B-8DAE-1953F412C126}" type="datetimeFigureOut">
               <a:rPr lang="en-US" dirty="0"/>
-              <a:t>4/21/2021</a:t>
+              <a:t>4/24/2021</a:t>
             </a:fld>
             <a:endParaRPr lang="en-US" dirty="0"/>
           </a:p>
@@ -2776,7 +2776,7 @@
             <a:fld id="{48A87A34-81AB-432B-8DAE-1953F412C126}" type="datetimeFigureOut">
               <a:rPr lang="en-US" dirty="0"/>
               <a:pPr/>
-              <a:t>4/21/2021</a:t>
+              <a:t>4/24/2021</a:t>
             </a:fld>
             <a:endParaRPr lang="en-US" dirty="0"/>
           </a:p>
@@ -3099,7 +3099,7 @@
             <a:fld id="{48A87A34-81AB-432B-8DAE-1953F412C126}" type="datetimeFigureOut">
               <a:rPr lang="en-US" dirty="0"/>
               <a:pPr/>
-              <a:t>4/21/2021</a:t>
+              <a:t>4/24/2021</a:t>
             </a:fld>
             <a:endParaRPr lang="en-US" dirty="0"/>
           </a:p>

</xml_diff>